<commit_message>
finalized challenge, success, and future slides
</commit_message>
<xml_diff>
--- a/find-my-fruit_project1_HunterKatie.pptx
+++ b/find-my-fruit_project1_HunterKatie.pptx
@@ -18408,20 +18408,39 @@
           <a:lstStyle/>
           <a:p>
             <a:r>
-              <a:rPr lang="en-US" dirty="0"/>
-              <a:t>Identifying server-side APIs</a:t>
+              <a:rPr lang="en-US" sz="2400" b="1" dirty="0"/>
+              <a:t>Identifying </a:t>
+            </a:r>
+            <a:r>
+              <a:rPr lang="en-US" sz="2400" dirty="0"/>
+              <a:t>relevant server-side APIs</a:t>
             </a:r>
           </a:p>
           <a:p>
-            <a:r>
-              <a:rPr lang="en-US" dirty="0"/>
-              <a:t>Using client-side storage</a:t>
-            </a:r>
+            <a:endParaRPr lang="en-US" sz="2400" dirty="0"/>
           </a:p>
           <a:p>
             <a:r>
-              <a:rPr lang="en-US" dirty="0"/>
-              <a:t>Overcoming multiple CORS issues</a:t>
+              <a:rPr lang="en-US" sz="2400" b="1" dirty="0"/>
+              <a:t>Error Handling </a:t>
+            </a:r>
+            <a:r>
+              <a:rPr lang="en-US" sz="2400" dirty="0"/>
+              <a:t>– invalid search terms </a:t>
+            </a:r>
+            <a:endParaRPr lang="en-US" sz="2400" b="1" dirty="0"/>
+          </a:p>
+          <a:p>
+            <a:endParaRPr lang="en-US" sz="2400" b="1" dirty="0"/>
+          </a:p>
+          <a:p>
+            <a:r>
+              <a:rPr lang="en-US" sz="2400" b="1" dirty="0"/>
+              <a:t>CORS </a:t>
+            </a:r>
+            <a:r>
+              <a:rPr lang="en-US" sz="2400" dirty="0"/>
+              <a:t>issues – requesting API access daily</a:t>
             </a:r>
           </a:p>
           <a:p>
@@ -18516,27 +18535,52 @@
           <a:bodyPr/>
           <a:lstStyle/>
           <a:p>
+            <a:endParaRPr lang="en-US" sz="2400" dirty="0"/>
+          </a:p>
+          <a:p>
             <a:r>
-              <a:rPr lang="en-US" dirty="0"/>
-              <a:t>Successfully pulled consistent data from 2 different APIs</a:t>
+              <a:rPr lang="en-US" sz="2400" b="1" dirty="0"/>
+              <a:t>Secondary Search </a:t>
+            </a:r>
+            <a:r>
+              <a:rPr lang="en-US" sz="2400" dirty="0"/>
+              <a:t>functionality via a dropdown</a:t>
+            </a:r>
+            <a:endParaRPr lang="en-US" sz="2400" b="1" dirty="0"/>
+          </a:p>
+          <a:p>
+            <a:endParaRPr lang="en-US" sz="2400" b="1" dirty="0"/>
+          </a:p>
+          <a:p>
+            <a:r>
+              <a:rPr lang="en-US" sz="2400" b="1" dirty="0"/>
+              <a:t>Nutrition Label </a:t>
+            </a:r>
+            <a:r>
+              <a:rPr lang="en-US" sz="2400" dirty="0"/>
+              <a:t>data &amp; design</a:t>
             </a:r>
           </a:p>
           <a:p>
+            <a:endParaRPr lang="en-US" sz="2400" dirty="0"/>
+          </a:p>
+          <a:p>
             <a:r>
-              <a:rPr lang="en-US" dirty="0"/>
-              <a:t>Created a responsive design using a new CSS framework (MUI)</a:t>
+              <a:rPr lang="en-US" sz="2400" b="1" dirty="0"/>
+              <a:t>Flagging </a:t>
+            </a:r>
+            <a:r>
+              <a:rPr lang="en-US" sz="2400" dirty="0"/>
+              <a:t>invalid searches via modals</a:t>
             </a:r>
           </a:p>
           <a:p>
-            <a:r>
-              <a:rPr lang="en-US" dirty="0"/>
-              <a:t>Designing a Nutrition Label  </a:t>
-            </a:r>
+            <a:endParaRPr lang="en-US" sz="2400" b="1" dirty="0"/>
           </a:p>
           <a:p>
-            <a:endParaRPr lang="en-US" dirty="0"/>
-          </a:p>
-          <a:p>
+            <a:pPr marL="114300" indent="0">
+              <a:buNone/>
+            </a:pPr>
             <a:endParaRPr lang="en-US" dirty="0"/>
           </a:p>
         </p:txBody>
@@ -18699,8 +18743,29 @@
               </a:spcAft>
             </a:pPr>
             <a:r>
+              <a:rPr lang="en-US" b="1" dirty="0"/>
+              <a:t>STYLING</a:t>
+            </a:r>
+            <a:br>
+              <a:rPr lang="en-US" b="1" dirty="0"/>
+            </a:br>
+            <a:r>
               <a:rPr lang="en-US" dirty="0"/>
-              <a:t>Adding in an image or pulling more information from the API</a:t>
+              <a:t>Utilize a more advanced CSS Framework</a:t>
+            </a:r>
+            <a:br>
+              <a:rPr lang="en-US" dirty="0"/>
+            </a:br>
+            <a:r>
+              <a:rPr lang="en-US" dirty="0"/>
+              <a:t>Add product images </a:t>
+            </a:r>
+            <a:br>
+              <a:rPr lang="en-US" dirty="0"/>
+            </a:br>
+            <a:r>
+              <a:rPr lang="en-US" dirty="0"/>
+              <a:t>Incorporate icons into dropdown</a:t>
             </a:r>
           </a:p>
           <a:p>
@@ -18710,19 +18775,29 @@
               </a:spcAft>
             </a:pPr>
             <a:r>
+              <a:rPr lang="en-US" b="1" dirty="0"/>
+              <a:t>FUNCTIONALITY</a:t>
+            </a:r>
+            <a:br>
               <a:rPr lang="en-US" dirty="0"/>
-              <a:t>Create a for loop to populate info for more than 1 fruit at a time and create a user-friendly design to showcase this information</a:t>
-            </a:r>
-          </a:p>
-          <a:p>
-            <a:pPr marL="285750" indent="-285750">
-              <a:spcAft>
-                <a:spcPts val="1600"/>
-              </a:spcAft>
-            </a:pPr>
+            </a:br>
             <a:r>
               <a:rPr lang="en-US" dirty="0"/>
-              <a:t>Find a way to pull information from the second API faster.</a:t>
+              <a:t>Display multiple fruit products with each search</a:t>
+            </a:r>
+            <a:br>
+              <a:rPr lang="en-US" dirty="0"/>
+            </a:br>
+            <a:r>
+              <a:rPr lang="en-US" dirty="0"/>
+              <a:t>Store user product preferences (i.e. local storage to generate a shopping list)</a:t>
+            </a:r>
+            <a:br>
+              <a:rPr lang="en-US" dirty="0"/>
+            </a:br>
+            <a:r>
+              <a:rPr lang="en-US" dirty="0"/>
+              <a:t>Provide additional facts or fruit information using additional APIs</a:t>
             </a:r>
           </a:p>
           <a:p>

</xml_diff>